<commit_message>
docs/diagram: Update sequence diagram
Updated the diagram due to improvement to the command.
</commit_message>
<xml_diff>
--- a/docs/diagrams/RegisterSequenceDiagram.pptx
+++ b/docs/diagrams/RegisterSequenceDiagram.pptx
@@ -208,7 +208,7 @@
           <a:p>
             <a:fld id="{F5CC4B3F-88C1-4FFA-B1B6-F41C21DC6924}" type="datetimeFigureOut">
               <a:rPr lang="en-US" smtClean="0"/>
-              <a:t>10/24/2018</a:t>
+              <a:t>11/11/2018</a:t>
             </a:fld>
             <a:endParaRPr lang="en-US"/>
           </a:p>
@@ -654,7 +654,7 @@
           <a:p>
             <a:fld id="{78C97017-6FC3-485B-9764-EAC9E56C1D49}" type="datetimeFigureOut">
               <a:rPr lang="en-US" smtClean="0"/>
-              <a:t>10/24/2018</a:t>
+              <a:t>11/11/2018</a:t>
             </a:fld>
             <a:endParaRPr lang="en-US"/>
           </a:p>
@@ -822,7 +822,7 @@
           <a:p>
             <a:fld id="{78C97017-6FC3-485B-9764-EAC9E56C1D49}" type="datetimeFigureOut">
               <a:rPr lang="en-US" smtClean="0"/>
-              <a:t>10/24/2018</a:t>
+              <a:t>11/11/2018</a:t>
             </a:fld>
             <a:endParaRPr lang="en-US"/>
           </a:p>
@@ -1000,7 +1000,7 @@
           <a:p>
             <a:fld id="{78C97017-6FC3-485B-9764-EAC9E56C1D49}" type="datetimeFigureOut">
               <a:rPr lang="en-US" smtClean="0"/>
-              <a:t>10/24/2018</a:t>
+              <a:t>11/11/2018</a:t>
             </a:fld>
             <a:endParaRPr lang="en-US"/>
           </a:p>
@@ -1168,7 +1168,7 @@
           <a:p>
             <a:fld id="{78C97017-6FC3-485B-9764-EAC9E56C1D49}" type="datetimeFigureOut">
               <a:rPr lang="en-US" smtClean="0"/>
-              <a:t>10/24/2018</a:t>
+              <a:t>11/11/2018</a:t>
             </a:fld>
             <a:endParaRPr lang="en-US"/>
           </a:p>
@@ -1413,7 +1413,7 @@
           <a:p>
             <a:fld id="{78C97017-6FC3-485B-9764-EAC9E56C1D49}" type="datetimeFigureOut">
               <a:rPr lang="en-US" smtClean="0"/>
-              <a:t>10/24/2018</a:t>
+              <a:t>11/11/2018</a:t>
             </a:fld>
             <a:endParaRPr lang="en-US"/>
           </a:p>
@@ -1698,7 +1698,7 @@
           <a:p>
             <a:fld id="{78C97017-6FC3-485B-9764-EAC9E56C1D49}" type="datetimeFigureOut">
               <a:rPr lang="en-US" smtClean="0"/>
-              <a:t>10/24/2018</a:t>
+              <a:t>11/11/2018</a:t>
             </a:fld>
             <a:endParaRPr lang="en-US"/>
           </a:p>
@@ -2117,7 +2117,7 @@
           <a:p>
             <a:fld id="{78C97017-6FC3-485B-9764-EAC9E56C1D49}" type="datetimeFigureOut">
               <a:rPr lang="en-US" smtClean="0"/>
-              <a:t>10/24/2018</a:t>
+              <a:t>11/11/2018</a:t>
             </a:fld>
             <a:endParaRPr lang="en-US"/>
           </a:p>
@@ -2234,7 +2234,7 @@
           <a:p>
             <a:fld id="{78C97017-6FC3-485B-9764-EAC9E56C1D49}" type="datetimeFigureOut">
               <a:rPr lang="en-US" smtClean="0"/>
-              <a:t>10/24/2018</a:t>
+              <a:t>11/11/2018</a:t>
             </a:fld>
             <a:endParaRPr lang="en-US"/>
           </a:p>
@@ -2329,7 +2329,7 @@
           <a:p>
             <a:fld id="{78C97017-6FC3-485B-9764-EAC9E56C1D49}" type="datetimeFigureOut">
               <a:rPr lang="en-US" smtClean="0"/>
-              <a:t>10/24/2018</a:t>
+              <a:t>11/11/2018</a:t>
             </a:fld>
             <a:endParaRPr lang="en-US"/>
           </a:p>
@@ -2604,7 +2604,7 @@
           <a:p>
             <a:fld id="{78C97017-6FC3-485B-9764-EAC9E56C1D49}" type="datetimeFigureOut">
               <a:rPr lang="en-US" smtClean="0"/>
-              <a:t>10/24/2018</a:t>
+              <a:t>11/11/2018</a:t>
             </a:fld>
             <a:endParaRPr lang="en-US"/>
           </a:p>
@@ -2856,7 +2856,7 @@
           <a:p>
             <a:fld id="{78C97017-6FC3-485B-9764-EAC9E56C1D49}" type="datetimeFigureOut">
               <a:rPr lang="en-US" smtClean="0"/>
-              <a:t>10/24/2018</a:t>
+              <a:t>11/11/2018</a:t>
             </a:fld>
             <a:endParaRPr lang="en-US"/>
           </a:p>
@@ -3067,7 +3067,7 @@
           <a:p>
             <a:fld id="{78C97017-6FC3-485B-9764-EAC9E56C1D49}" type="datetimeFigureOut">
               <a:rPr lang="en-US" smtClean="0"/>
-              <a:t>10/24/2018</a:t>
+              <a:t>11/11/2018</a:t>
             </a:fld>
             <a:endParaRPr lang="en-US"/>
           </a:p>
@@ -3450,8 +3450,8 @@
         </p:nvSpPr>
         <p:spPr>
           <a:xfrm>
-            <a:off x="6485703" y="105492"/>
-            <a:ext cx="3762937" cy="4400926"/>
+            <a:off x="6423520" y="105492"/>
+            <a:ext cx="3663603" cy="4400926"/>
           </a:xfrm>
           <a:prstGeom prst="roundRect">
             <a:avLst>
@@ -4014,7 +4014,7 @@
         <p:spPr>
           <a:xfrm>
             <a:off x="-321982" y="1318818"/>
-            <a:ext cx="1752926" cy="430887"/>
+            <a:ext cx="1752926" cy="646331"/>
           </a:xfrm>
           <a:prstGeom prst="rect">
             <a:avLst/>
@@ -4034,7 +4034,7 @@
                   <a:srgbClr val="0070C0"/>
                 </a:solidFill>
               </a:rPr>
-              <a:t>execute(“register id/azhikai pw/1122qq”)</a:t>
+              <a:t>execute(“register id/azhikai pw/1122qq n/Ang Zhi Kai”)</a:t>
             </a:r>
           </a:p>
         </p:txBody>
@@ -4351,8 +4351,8 @@
         </p:nvSpPr>
         <p:spPr>
           <a:xfrm>
-            <a:off x="2065399" y="917131"/>
-            <a:ext cx="1899551" cy="430887"/>
+            <a:off x="1932543" y="948463"/>
+            <a:ext cx="1899551" cy="646331"/>
           </a:xfrm>
           <a:prstGeom prst="rect">
             <a:avLst/>
@@ -4382,7 +4382,7 @@
             </a:r>
             <a:r>
               <a:rPr lang="en-US" dirty="0"/>
-              <a:t>(“register id/azhikai pw/1122qq”)</a:t>
+              <a:t>(“register id/azhikai pw/1122qq n/Ang Zhi Kai”)</a:t>
             </a:r>
           </a:p>
         </p:txBody>
@@ -4475,7 +4475,7 @@
         </p:nvSpPr>
         <p:spPr>
           <a:xfrm>
-            <a:off x="7743381" y="2568606"/>
+            <a:off x="7734678" y="2568606"/>
             <a:ext cx="2181777" cy="335427"/>
           </a:xfrm>
           <a:prstGeom prst="rect">
@@ -4542,7 +4542,7 @@
         </p:nvSpPr>
         <p:spPr>
           <a:xfrm>
-            <a:off x="8760433" y="3182840"/>
+            <a:off x="8751730" y="3182840"/>
             <a:ext cx="129933" cy="398562"/>
           </a:xfrm>
           <a:prstGeom prst="rect">
@@ -4630,7 +4630,7 @@
         </p:nvSpPr>
         <p:spPr>
           <a:xfrm>
-            <a:off x="6795991" y="2362200"/>
+            <a:off x="6787288" y="2362200"/>
             <a:ext cx="841636" cy="300180"/>
           </a:xfrm>
           <a:prstGeom prst="rect">
@@ -4691,7 +4691,7 @@
         </p:nvCxnSpPr>
         <p:spPr>
           <a:xfrm flipH="1">
-            <a:off x="7232717" y="2653306"/>
+            <a:off x="7224014" y="2653306"/>
             <a:ext cx="3959" cy="1735710"/>
           </a:xfrm>
           <a:prstGeom prst="line">
@@ -4728,7 +4728,7 @@
         </p:nvSpPr>
         <p:spPr>
           <a:xfrm>
-            <a:off x="7133753" y="2958106"/>
+            <a:off x="7125050" y="2958106"/>
             <a:ext cx="168896" cy="775693"/>
           </a:xfrm>
           <a:prstGeom prst="rect">
@@ -4776,9 +4776,9 @@
           <p:nvPr/>
         </p:nvCxnSpPr>
         <p:spPr>
-          <a:xfrm>
-            <a:off x="5685755" y="2975344"/>
-            <a:ext cx="1447998" cy="0"/>
+          <a:xfrm flipV="1">
+            <a:off x="5685755" y="2958106"/>
+            <a:ext cx="2248358" cy="17238"/>
           </a:xfrm>
           <a:prstGeom prst="straightConnector1">
             <a:avLst/>
@@ -5047,7 +5047,7 @@
         </p:nvCxnSpPr>
         <p:spPr>
           <a:xfrm>
-            <a:off x="8834269" y="2871355"/>
+            <a:off x="8825566" y="2871355"/>
             <a:ext cx="17996" cy="1467648"/>
           </a:xfrm>
           <a:prstGeom prst="line">
@@ -5084,7 +5084,7 @@
         </p:nvSpPr>
         <p:spPr>
           <a:xfrm>
-            <a:off x="7081145" y="2984912"/>
+            <a:off x="7072442" y="2984912"/>
             <a:ext cx="1679288" cy="184666"/>
           </a:xfrm>
           <a:prstGeom prst="rect">
@@ -5154,7 +5154,7 @@
         </p:nvCxnSpPr>
         <p:spPr>
           <a:xfrm>
-            <a:off x="7290217" y="3182839"/>
+            <a:off x="7281514" y="3182839"/>
             <a:ext cx="1470216" cy="0"/>
           </a:xfrm>
           <a:prstGeom prst="straightConnector1">
@@ -5198,7 +5198,7 @@
         </p:nvCxnSpPr>
         <p:spPr>
           <a:xfrm flipV="1">
-            <a:off x="7290217" y="3564914"/>
+            <a:off x="7281514" y="3564914"/>
             <a:ext cx="1470216" cy="6325"/>
           </a:xfrm>
           <a:prstGeom prst="straightConnector1">
@@ -5245,7 +5245,7 @@
         </p:nvCxnSpPr>
         <p:spPr>
           <a:xfrm>
-            <a:off x="5685755" y="3733799"/>
+            <a:off x="5677052" y="3733799"/>
             <a:ext cx="1532446" cy="0"/>
           </a:xfrm>
           <a:prstGeom prst="straightConnector1">

</xml_diff>